<commit_message>
Update Instruções para testes
</commit_message>
<xml_diff>
--- a/presentation/Sollunah Coin.pptx
+++ b/presentation/Sollunah Coin.pptx
@@ -4899,26 +4899,6 @@
                 <a:latin typeface="-apple-system"/>
               </a:rPr>
               <a:t>install</a:t>
-            </a:r>
-            <a:r>
-              <a:rPr lang="pt-BR" sz="1400" b="0" i="0" dirty="0">
-                <a:solidFill>
-                  <a:schemeClr val="tx1"/>
-                </a:solidFill>
-                <a:effectLst/>
-                <a:latin typeface="-apple-system"/>
-              </a:rPr>
-              <a:t> </a:t>
-            </a:r>
-            <a:r>
-              <a:rPr lang="pt-BR" sz="1400" b="0" i="0" dirty="0" err="1">
-                <a:solidFill>
-                  <a:schemeClr val="tx1"/>
-                </a:solidFill>
-                <a:effectLst/>
-                <a:latin typeface="-apple-system"/>
-              </a:rPr>
-              <a:t>hardhat</a:t>
             </a:r>
             <a:endParaRPr lang="pt-BR" sz="1400" b="0" i="0" dirty="0">
               <a:solidFill>

</xml_diff>

<commit_message>
Update Objetivos, update Power Point
</commit_message>
<xml_diff>
--- a/presentation/Sollunah Coin.pptx
+++ b/presentation/Sollunah Coin.pptx
@@ -215,7 +215,7 @@
             <a:pPr rtl="0"/>
             <a:fld id="{5C3E0910-793C-46A0-8623-CEAD4857882F}" type="datetime1">
               <a:rPr lang="pt-BR" smtClean="0"/>
-              <a:t>19/06/2022</a:t>
+              <a:t>20/06/2022</a:t>
             </a:fld>
             <a:endParaRPr lang="en-US" dirty="0"/>
           </a:p>
@@ -385,7 +385,7 @@
             <a:pPr rtl="0"/>
             <a:fld id="{49EE704A-765A-48C7-8594-25B15929F837}" type="datetime1">
               <a:rPr lang="pt-BR" smtClean="0"/>
-              <a:t>19/06/2022</a:t>
+              <a:t>20/06/2022</a:t>
             </a:fld>
             <a:endParaRPr lang="en-US"/>
           </a:p>
@@ -905,7 +905,7 @@
             <a:pPr rtl="0"/>
             <a:fld id="{3E92B5B4-4D0A-4964-A1A3-B85B0EE00890}" type="datetime1">
               <a:rPr lang="pt-BR" smtClean="0"/>
-              <a:t>19/06/2022</a:t>
+              <a:t>20/06/2022</a:t>
             </a:fld>
             <a:endParaRPr lang="en-US" dirty="0"/>
           </a:p>
@@ -1101,7 +1101,7 @@
             <a:pPr rtl="0"/>
             <a:fld id="{32E1A5F9-C71D-4DE8-8BF4-9F6FC06A94B8}" type="datetime1">
               <a:rPr lang="pt-BR" smtClean="0"/>
-              <a:t>19/06/2022</a:t>
+              <a:t>20/06/2022</a:t>
             </a:fld>
             <a:endParaRPr lang="en-US" dirty="0"/>
           </a:p>
@@ -1351,7 +1351,7 @@
             <a:pPr rtl="0"/>
             <a:fld id="{421DCD7D-5BFD-485D-AED5-B62EAACA4CB6}" type="datetime1">
               <a:rPr lang="pt-BR" smtClean="0"/>
-              <a:t>19/06/2022</a:t>
+              <a:t>20/06/2022</a:t>
             </a:fld>
             <a:endParaRPr lang="en-US" dirty="0"/>
           </a:p>
@@ -1547,7 +1547,7 @@
             <a:pPr rtl="0"/>
             <a:fld id="{623252B5-F3E6-4058-A723-196087E9E541}" type="datetime1">
               <a:rPr lang="pt-BR" smtClean="0"/>
-              <a:t>19/06/2022</a:t>
+              <a:t>20/06/2022</a:t>
             </a:fld>
             <a:endParaRPr lang="en-US" dirty="0"/>
           </a:p>
@@ -1924,7 +1924,7 @@
             <a:pPr rtl="0"/>
             <a:fld id="{1A251DFA-97D2-4C90-9100-D1173CC96C37}" type="datetime1">
               <a:rPr lang="pt-BR" smtClean="0"/>
-              <a:t>19/06/2022</a:t>
+              <a:t>20/06/2022</a:t>
             </a:fld>
             <a:endParaRPr lang="en-US" dirty="0"/>
           </a:p>
@@ -2183,7 +2183,7 @@
             <a:pPr rtl="0"/>
             <a:fld id="{7651B26C-F0DB-4889-B6A3-FE07E152272F}" type="datetime1">
               <a:rPr lang="pt-BR" smtClean="0"/>
-              <a:t>19/06/2022</a:t>
+              <a:t>20/06/2022</a:t>
             </a:fld>
             <a:endParaRPr lang="en-US" dirty="0"/>
           </a:p>
@@ -2588,7 +2588,7 @@
             <a:pPr rtl="0"/>
             <a:fld id="{DB0565EE-A4B5-4AB4-9432-D16ECAE9EF1F}" type="datetime1">
               <a:rPr lang="pt-BR" smtClean="0"/>
-              <a:t>19/06/2022</a:t>
+              <a:t>20/06/2022</a:t>
             </a:fld>
             <a:endParaRPr lang="en-US" dirty="0"/>
           </a:p>
@@ -2728,7 +2728,7 @@
             <a:pPr rtl="0"/>
             <a:fld id="{FC470C2D-02C8-4A1B-A79F-498A53DD951F}" type="datetime1">
               <a:rPr lang="pt-BR" smtClean="0"/>
-              <a:t>19/06/2022</a:t>
+              <a:t>20/06/2022</a:t>
             </a:fld>
             <a:endParaRPr lang="en-US" dirty="0"/>
           </a:p>
@@ -2888,7 +2888,7 @@
             <a:pPr rtl="0"/>
             <a:fld id="{9094EF83-1835-4C7A-B4B2-F0B720F5AC0B}" type="datetime1">
               <a:rPr lang="pt-BR" smtClean="0"/>
-              <a:t>19/06/2022</a:t>
+              <a:t>20/06/2022</a:t>
             </a:fld>
             <a:endParaRPr lang="en-US" dirty="0"/>
           </a:p>
@@ -3221,7 +3221,7 @@
             <a:pPr rtl="0"/>
             <a:fld id="{6F5D5688-1774-4625-9E74-88EA94DB2550}" type="datetime1">
               <a:rPr lang="pt-BR" smtClean="0"/>
-              <a:t>19/06/2022</a:t>
+              <a:t>20/06/2022</a:t>
             </a:fld>
             <a:endParaRPr lang="en-US" dirty="0"/>
           </a:p>
@@ -3576,7 +3576,7 @@
             <a:pPr rtl="0"/>
             <a:fld id="{3D5E4E1C-696A-4E82-B6DD-87ECA4CC925A}" type="datetime1">
               <a:rPr lang="pt-BR" smtClean="0"/>
-              <a:t>19/06/2022</a:t>
+              <a:t>20/06/2022</a:t>
             </a:fld>
             <a:endParaRPr lang="en-US" dirty="0"/>
           </a:p>
@@ -3840,7 +3840,7 @@
             <a:pPr rtl="0"/>
             <a:fld id="{66BA6665-D630-4C43-9989-3D086DA68E5F}" type="datetime1">
               <a:rPr lang="pt-BR" smtClean="0"/>
-              <a:t>19/06/2022</a:t>
+              <a:t>20/06/2022</a:t>
             </a:fld>
             <a:endParaRPr lang="en-US" dirty="0"/>
           </a:p>
@@ -6114,60 +6114,48 @@
           <a:p>
             <a:pPr algn="just"/>
             <a:r>
-              <a:rPr lang="pt-BR" sz="3200" dirty="0">
+              <a:rPr lang="pt-BR" sz="3600" dirty="0">
                 <a:latin typeface="-apple-system"/>
               </a:rPr>
               <a:t>Construir um </a:t>
             </a:r>
             <a:r>
-              <a:rPr lang="pt-BR" sz="3200" dirty="0" err="1">
+              <a:rPr lang="pt-BR" sz="3600" dirty="0" err="1">
                 <a:latin typeface="-apple-system"/>
               </a:rPr>
               <a:t>Smart</a:t>
             </a:r>
             <a:r>
-              <a:rPr lang="pt-BR" sz="3200" dirty="0">
+              <a:rPr lang="pt-BR" sz="3600" dirty="0">
                 <a:latin typeface="-apple-system"/>
               </a:rPr>
               <a:t> </a:t>
             </a:r>
             <a:r>
-              <a:rPr lang="pt-BR" sz="3200" dirty="0" err="1">
+              <a:rPr lang="pt-BR" sz="3600" dirty="0" err="1">
                 <a:latin typeface="-apple-system"/>
               </a:rPr>
               <a:t>Contract</a:t>
             </a:r>
             <a:r>
-              <a:rPr lang="pt-BR" sz="3200" dirty="0">
+              <a:rPr lang="pt-BR" sz="3600" dirty="0">
                 <a:latin typeface="-apple-system"/>
               </a:rPr>
-              <a:t>, utilizando </a:t>
-            </a:r>
-            <a:r>
-              <a:rPr lang="pt-BR" sz="3200" dirty="0" err="1">
+              <a:t> de uma máquina de vendas, utilizando </a:t>
+            </a:r>
+            <a:r>
+              <a:rPr lang="pt-BR" sz="3600" dirty="0" err="1">
                 <a:latin typeface="-apple-system"/>
               </a:rPr>
               <a:t>Solidity</a:t>
             </a:r>
             <a:r>
-              <a:rPr lang="pt-BR" sz="3200" dirty="0">
+              <a:rPr lang="pt-BR" sz="3600" dirty="0">
                 <a:latin typeface="-apple-system"/>
               </a:rPr>
-              <a:t> e todas as bibliotecas e tecnologias que aprendemos durante o curso e disponibiliza-las na rede </a:t>
-            </a:r>
-            <a:r>
-              <a:rPr lang="pt-BR" sz="3200" dirty="0" err="1">
-                <a:latin typeface="-apple-system"/>
-              </a:rPr>
-              <a:t>Ethereum</a:t>
-            </a:r>
-            <a:r>
-              <a:rPr lang="pt-BR" sz="3200" dirty="0">
-                <a:latin typeface="-apple-system"/>
-              </a:rPr>
-              <a:t>.</a:t>
-            </a:r>
-            <a:endParaRPr lang="pt-BR" sz="3200" dirty="0">
+              <a:t> e todas as bibliotecas e tecnologias que aprendemos durante o curso.</a:t>
+            </a:r>
+            <a:endParaRPr lang="pt-BR" sz="3600" dirty="0">
               <a:latin typeface="-apple-system"/>
               <a:hlinkClick r:id="rId2"/>
             </a:endParaRPr>
@@ -6205,19 +6193,19 @@
       </p:sp>
       <p:pic>
         <p:nvPicPr>
-          <p:cNvPr id="9" name="Imagem 8">
-            <a:extLst>
-              <a:ext uri="{FF2B5EF4-FFF2-40B4-BE49-F238E27FC236}">
-                <a16:creationId xmlns:a16="http://schemas.microsoft.com/office/drawing/2014/main" id="{1A4797EA-B8C2-99C8-9095-68174DB97E2B}"/>
+          <p:cNvPr id="1026" name="Picture 2">
+            <a:extLst>
+              <a:ext uri="{FF2B5EF4-FFF2-40B4-BE49-F238E27FC236}">
+                <a16:creationId xmlns:a16="http://schemas.microsoft.com/office/drawing/2014/main" id="{AB6F3D6A-67DA-CAAE-F663-48A011955130}"/>
               </a:ext>
             </a:extLst>
           </p:cNvPr>
           <p:cNvPicPr>
-            <a:picLocks noChangeAspect="1"/>
+            <a:picLocks noChangeAspect="1" noChangeArrowheads="1"/>
           </p:cNvPicPr>
           <p:nvPr/>
         </p:nvPicPr>
-        <p:blipFill rotWithShape="1">
+        <p:blipFill>
           <a:blip r:embed="rId3">
             <a:extLst>
               <a:ext uri="{28A0092B-C50C-407E-A947-70E740481C1C}">
@@ -6225,17 +6213,29 @@
               </a:ext>
             </a:extLst>
           </a:blip>
-          <a:srcRect l="14366" r="6923"/>
-          <a:stretch/>
+          <a:srcRect/>
+          <a:stretch>
+            <a:fillRect/>
+          </a:stretch>
         </p:blipFill>
-        <p:spPr>
-          <a:xfrm>
-            <a:off x="-10758" y="3221272"/>
-            <a:ext cx="4669228" cy="2884334"/>
+        <p:spPr bwMode="auto">
+          <a:xfrm>
+            <a:off x="0" y="3186439"/>
+            <a:ext cx="4658470" cy="2920010"/>
           </a:xfrm>
           <a:prstGeom prst="rect">
             <a:avLst/>
           </a:prstGeom>
+          <a:noFill/>
+          <a:extLst>
+            <a:ext uri="{909E8E84-426E-40DD-AFC4-6F175D3DCCD1}">
+              <a14:hiddenFill xmlns:a14="http://schemas.microsoft.com/office/drawing/2010/main">
+                <a:solidFill>
+                  <a:srgbClr val="FFFFFF"/>
+                </a:solidFill>
+              </a14:hiddenFill>
+            </a:ext>
+          </a:extLst>
         </p:spPr>
       </p:pic>
     </p:spTree>

</xml_diff>